<commit_message>
another edit of dm.pptx
</commit_message>
<xml_diff>
--- a/dm.pptx
+++ b/dm.pptx
@@ -11,7 +11,7 @@
     <p:handoutMasterId r:id="rId27"/>
   </p:handoutMasterIdLst>
   <p:sldIdLst>
-    <p:sldId id="256" r:id="rId2"/>
+    <p:sldId id="280" r:id="rId2"/>
     <p:sldId id="257" r:id="rId3"/>
     <p:sldId id="258" r:id="rId4"/>
     <p:sldId id="259" r:id="rId5"/>
@@ -1392,13 +1392,22 @@
         <p:spPr/>
         <p:txBody>
           <a:bodyPr/>
-          <a:lstStyle/>
+          <a:lstStyle>
+            <a:lvl1pPr>
+              <a:defRPr>
+                <a:solidFill>
+                  <a:schemeClr val="tx1"/>
+                </a:solidFill>
+              </a:defRPr>
+            </a:lvl1pPr>
+          </a:lstStyle>
           <a:p>
             <a:fld id="{8FBBBD6E-822E-0F45-BF85-2E83A582DBF9}" type="slidenum">
               <a:rPr lang="en-US" smtClean="0"/>
+              <a:pPr/>
               <a:t>‹#›</a:t>
             </a:fld>
-            <a:endParaRPr lang="en-US"/>
+            <a:endParaRPr lang="en-US" dirty="0"/>
           </a:p>
         </p:txBody>
       </p:sp>
@@ -3669,29 +3678,59 @@
         </p:nvSpPr>
         <p:spPr>
           <a:xfrm>
-            <a:off x="685800" y="483805"/>
-            <a:ext cx="7772400" cy="759919"/>
+            <a:off x="304800" y="838200"/>
+            <a:ext cx="8686800" cy="917575"/>
           </a:xfrm>
         </p:spPr>
         <p:txBody>
           <a:bodyPr>
-            <a:noAutofit/>
+            <a:normAutofit fontScale="90000"/>
           </a:bodyPr>
           <a:lstStyle/>
           <a:p>
             <a:r>
-              <a:rPr lang="en-US" sz="3200" dirty="0" smtClean="0"/>
+              <a:rPr lang="en-US" sz="4000" dirty="0" smtClean="0">
+                <a:latin typeface="Arial" panose="020B0604020202020204" pitchFamily="34" charset="0"/>
+                <a:cs typeface="Arial" panose="020B0604020202020204" pitchFamily="34" charset="0"/>
+              </a:rPr>
               <a:t>Introduction to </a:t>
             </a:r>
             <a:r>
-              <a:rPr lang="en-US" sz="3200" dirty="0" err="1" smtClean="0"/>
+              <a:rPr lang="en-US" sz="4000" dirty="0" err="1" smtClean="0">
+                <a:latin typeface="Arial" panose="020B0604020202020204" pitchFamily="34" charset="0"/>
+                <a:cs typeface="Arial" panose="020B0604020202020204" pitchFamily="34" charset="0"/>
+              </a:rPr>
               <a:t>Stata</a:t>
             </a:r>
             <a:r>
-              <a:rPr lang="en-US" sz="3200" dirty="0" smtClean="0"/>
-              <a:t> Data Management</a:t>
-            </a:r>
-            <a:endParaRPr lang="en-US" sz="3200" dirty="0"/>
+              <a:rPr lang="en-US" sz="4000" dirty="0" smtClean="0">
+                <a:latin typeface="Arial" panose="020B0604020202020204" pitchFamily="34" charset="0"/>
+                <a:cs typeface="Arial" panose="020B0604020202020204" pitchFamily="34" charset="0"/>
+              </a:rPr>
+              <a:t> </a:t>
+            </a:r>
+            <a:r>
+              <a:rPr lang="en-US" sz="4000" dirty="0" err="1" smtClean="0">
+                <a:latin typeface="Arial" panose="020B0604020202020204" pitchFamily="34" charset="0"/>
+                <a:cs typeface="Arial" panose="020B0604020202020204" pitchFamily="34" charset="0"/>
+              </a:rPr>
+              <a:t>Data</a:t>
+            </a:r>
+            <a:r>
+              <a:rPr lang="en-US" sz="4000" dirty="0" smtClean="0">
+                <a:latin typeface="Arial" panose="020B0604020202020204" pitchFamily="34" charset="0"/>
+                <a:cs typeface="Arial" panose="020B0604020202020204" pitchFamily="34" charset="0"/>
+              </a:rPr>
+              <a:t> Management</a:t>
+            </a:r>
+            <a:r>
+              <a:rPr lang="en-US" dirty="0" smtClean="0"/>
+              <a:t/>
+            </a:r>
+            <a:br>
+              <a:rPr lang="en-US" dirty="0" smtClean="0"/>
+            </a:br>
+            <a:endParaRPr lang="en-US" dirty="0"/>
           </a:p>
         </p:txBody>
       </p:sp>
@@ -3707,45 +3746,112 @@
         </p:nvSpPr>
         <p:spPr>
           <a:xfrm>
-            <a:off x="1371600" y="4694620"/>
-            <a:ext cx="6400800" cy="1252483"/>
+            <a:off x="1524000" y="5257800"/>
+            <a:ext cx="6400800" cy="838200"/>
           </a:xfrm>
         </p:spPr>
         <p:txBody>
-          <a:bodyPr>
-            <a:normAutofit fontScale="40000" lnSpcReduction="20000"/>
-          </a:bodyPr>
-          <a:lstStyle/>
-          <a:p>
-            <a:r>
-              <a:rPr lang="en-US" dirty="0" smtClean="0"/>
+          <a:bodyPr/>
+          <a:lstStyle/>
+          <a:p>
+            <a:pPr lvl="0" fontAlgn="base">
+              <a:spcBef>
+                <a:spcPct val="0"/>
+              </a:spcBef>
+              <a:spcAft>
+                <a:spcPct val="0"/>
+              </a:spcAft>
+            </a:pPr>
+            <a:r>
+              <a:rPr lang="en-US" sz="1200" dirty="0" smtClean="0">
+                <a:solidFill>
+                  <a:srgbClr val="000000"/>
+                </a:solidFill>
+                <a:latin typeface="Arial" charset="0"/>
+              </a:rPr>
               <a:t>Chang Y. Chung</a:t>
             </a:r>
-          </a:p>
-          <a:p>
-            <a:r>
-              <a:rPr lang="en-US" dirty="0" smtClean="0"/>
+            <a:endParaRPr lang="en-US" sz="1200" dirty="0">
+              <a:solidFill>
+                <a:srgbClr val="000000"/>
+              </a:solidFill>
+              <a:latin typeface="Arial" charset="0"/>
+            </a:endParaRPr>
+          </a:p>
+          <a:p>
+            <a:pPr lvl="0" fontAlgn="base">
+              <a:spcBef>
+                <a:spcPct val="0"/>
+              </a:spcBef>
+              <a:spcAft>
+                <a:spcPct val="0"/>
+              </a:spcAft>
+            </a:pPr>
+            <a:r>
+              <a:rPr lang="en-US" sz="1200" dirty="0">
+                <a:solidFill>
+                  <a:srgbClr val="000000"/>
+                </a:solidFill>
+                <a:latin typeface="Arial" charset="0"/>
+              </a:rPr>
               <a:t>Office of Population Research</a:t>
             </a:r>
           </a:p>
           <a:p>
-            <a:r>
-              <a:rPr lang="en-US" dirty="0" smtClean="0"/>
+            <a:pPr lvl="0" fontAlgn="base">
+              <a:spcBef>
+                <a:spcPct val="0"/>
+              </a:spcBef>
+              <a:spcAft>
+                <a:spcPct val="0"/>
+              </a:spcAft>
+            </a:pPr>
+            <a:r>
+              <a:rPr lang="en-US" sz="1200" dirty="0">
+                <a:solidFill>
+                  <a:srgbClr val="000000"/>
+                </a:solidFill>
+                <a:latin typeface="Arial" charset="0"/>
+              </a:rPr>
               <a:t>Princeton University</a:t>
             </a:r>
           </a:p>
           <a:p>
-            <a:r>
-              <a:rPr lang="en-US" dirty="0" smtClean="0"/>
-              <a:t>September 2013</a:t>
-            </a:r>
+            <a:pPr lvl="0" fontAlgn="base">
+              <a:spcBef>
+                <a:spcPct val="0"/>
+              </a:spcBef>
+              <a:spcAft>
+                <a:spcPct val="0"/>
+              </a:spcAft>
+            </a:pPr>
+            <a:r>
+              <a:rPr lang="en-US" sz="1200" dirty="0" smtClean="0">
+                <a:solidFill>
+                  <a:srgbClr val="000000"/>
+                </a:solidFill>
+                <a:latin typeface="Arial" charset="0"/>
+              </a:rPr>
+              <a:t>September </a:t>
+            </a:r>
+            <a:r>
+              <a:rPr lang="en-US" sz="1200" dirty="0">
+                <a:solidFill>
+                  <a:srgbClr val="000000"/>
+                </a:solidFill>
+                <a:latin typeface="Arial" charset="0"/>
+              </a:rPr>
+              <a:t>2013</a:t>
+            </a:r>
+          </a:p>
+          <a:p>
             <a:endParaRPr lang="en-US" dirty="0"/>
           </a:p>
         </p:txBody>
       </p:sp>
       <p:pic>
         <p:nvPicPr>
-          <p:cNvPr id="4" name="Picture 3"/>
+          <p:cNvPr id="5" name="Picture 4"/>
           <p:cNvPicPr>
             <a:picLocks noChangeAspect="1"/>
           </p:cNvPicPr>
@@ -3773,273 +3879,258 @@
           </a:prstGeom>
         </p:spPr>
       </p:pic>
-      <p:grpSp>
-        <p:nvGrpSpPr>
-          <p:cNvPr id="11" name="Group 10"/>
-          <p:cNvGrpSpPr/>
+      <p:sp>
+        <p:nvSpPr>
+          <p:cNvPr id="6" name="Rectangle 5"/>
+          <p:cNvSpPr/>
           <p:nvPr/>
-        </p:nvGrpSpPr>
-        <p:grpSpPr>
+        </p:nvSpPr>
+        <p:spPr>
           <a:xfrm>
-            <a:off x="1399532" y="1905000"/>
-            <a:ext cx="6248400" cy="2360448"/>
-            <a:chOff x="1066800" y="1905000"/>
-            <a:chExt cx="6979920" cy="2895600"/>
+            <a:off x="2362200" y="1905000"/>
+            <a:ext cx="2438400" cy="1143000"/>
           </a:xfrm>
-        </p:grpSpPr>
-        <p:sp>
-          <p:nvSpPr>
-            <p:cNvPr id="5" name="Rectangle 4"/>
-            <p:cNvSpPr/>
-            <p:nvPr/>
-          </p:nvSpPr>
-          <p:spPr>
-            <a:xfrm>
-              <a:off x="2362200" y="1905000"/>
-              <a:ext cx="2438400" cy="1143000"/>
-            </a:xfrm>
-            <a:prstGeom prst="rect">
-              <a:avLst/>
-            </a:prstGeom>
-          </p:spPr>
-          <p:style>
-            <a:lnRef idx="2">
-              <a:schemeClr val="accent1">
-                <a:shade val="50000"/>
-              </a:schemeClr>
-            </a:lnRef>
-            <a:fillRef idx="1">
-              <a:schemeClr val="accent1"/>
-            </a:fillRef>
-            <a:effectRef idx="0">
-              <a:schemeClr val="accent1"/>
-            </a:effectRef>
-            <a:fontRef idx="minor">
-              <a:schemeClr val="lt1"/>
-            </a:fontRef>
-          </p:style>
-          <p:txBody>
-            <a:bodyPr rtlCol="0" anchor="ctr"/>
-            <a:lstStyle/>
-            <a:p>
-              <a:pPr algn="ctr"/>
-              <a:endParaRPr lang="en-US"/>
-            </a:p>
-          </p:txBody>
-        </p:sp>
-        <p:sp>
-          <p:nvSpPr>
-            <p:cNvPr id="6" name="Rectangle 5"/>
-            <p:cNvSpPr/>
-            <p:nvPr/>
-          </p:nvSpPr>
-          <p:spPr>
-            <a:xfrm>
-              <a:off x="5410200" y="1905000"/>
-              <a:ext cx="1447800" cy="1143000"/>
-            </a:xfrm>
-            <a:prstGeom prst="rect">
-              <a:avLst/>
-            </a:prstGeom>
-          </p:spPr>
-          <p:style>
-            <a:lnRef idx="2">
-              <a:schemeClr val="accent1">
-                <a:shade val="50000"/>
-              </a:schemeClr>
-            </a:lnRef>
-            <a:fillRef idx="1">
-              <a:schemeClr val="accent1"/>
-            </a:fillRef>
-            <a:effectRef idx="0">
-              <a:schemeClr val="accent1"/>
-            </a:effectRef>
-            <a:fontRef idx="minor">
-              <a:schemeClr val="lt1"/>
-            </a:fontRef>
-          </p:style>
-          <p:txBody>
-            <a:bodyPr rtlCol="0" anchor="ctr"/>
-            <a:lstStyle/>
-            <a:p>
-              <a:pPr algn="ctr"/>
-              <a:endParaRPr lang="en-US"/>
-            </a:p>
-          </p:txBody>
-        </p:sp>
-        <p:sp>
-          <p:nvSpPr>
-            <p:cNvPr id="7" name="Rectangle 6"/>
-            <p:cNvSpPr/>
-            <p:nvPr/>
-          </p:nvSpPr>
-          <p:spPr>
-            <a:xfrm>
-              <a:off x="2667000" y="3657600"/>
-              <a:ext cx="2438400" cy="1143000"/>
-            </a:xfrm>
-            <a:prstGeom prst="rect">
-              <a:avLst/>
-            </a:prstGeom>
-          </p:spPr>
-          <p:style>
-            <a:lnRef idx="2">
-              <a:schemeClr val="accent1">
-                <a:shade val="50000"/>
-              </a:schemeClr>
-            </a:lnRef>
-            <a:fillRef idx="1">
-              <a:schemeClr val="accent1"/>
-            </a:fillRef>
-            <a:effectRef idx="0">
-              <a:schemeClr val="accent1"/>
-            </a:effectRef>
-            <a:fontRef idx="minor">
-              <a:schemeClr val="lt1"/>
-            </a:fontRef>
-          </p:style>
-          <p:txBody>
-            <a:bodyPr rtlCol="0" anchor="ctr"/>
-            <a:lstStyle/>
-            <a:p>
-              <a:pPr algn="ctr"/>
-              <a:endParaRPr lang="en-US"/>
-            </a:p>
-          </p:txBody>
-        </p:sp>
-        <p:sp>
-          <p:nvSpPr>
-            <p:cNvPr id="8" name="Rectangle 7"/>
-            <p:cNvSpPr/>
-            <p:nvPr/>
-          </p:nvSpPr>
-          <p:spPr>
-            <a:xfrm>
-              <a:off x="5105400" y="3657600"/>
-              <a:ext cx="1447800" cy="1143000"/>
-            </a:xfrm>
-            <a:prstGeom prst="rect">
-              <a:avLst/>
-            </a:prstGeom>
-          </p:spPr>
-          <p:style>
-            <a:lnRef idx="2">
-              <a:schemeClr val="accent1">
-                <a:shade val="50000"/>
-              </a:schemeClr>
-            </a:lnRef>
-            <a:fillRef idx="1">
-              <a:schemeClr val="accent1"/>
-            </a:fillRef>
-            <a:effectRef idx="0">
-              <a:schemeClr val="accent1"/>
-            </a:effectRef>
-            <a:fontRef idx="minor">
-              <a:schemeClr val="lt1"/>
-            </a:fontRef>
-          </p:style>
-          <p:txBody>
-            <a:bodyPr rtlCol="0" anchor="ctr"/>
-            <a:lstStyle/>
-            <a:p>
-              <a:pPr algn="ctr"/>
-              <a:endParaRPr lang="en-US"/>
-            </a:p>
-          </p:txBody>
-        </p:sp>
-        <p:sp>
-          <p:nvSpPr>
-            <p:cNvPr id="9" name="Curved Right Arrow 8"/>
-            <p:cNvSpPr/>
-            <p:nvPr/>
-          </p:nvSpPr>
-          <p:spPr>
-            <a:xfrm>
-              <a:off x="1066800" y="2819400"/>
-              <a:ext cx="731520" cy="1216152"/>
-            </a:xfrm>
-            <a:prstGeom prst="curvedRightArrow">
-              <a:avLst/>
-            </a:prstGeom>
-          </p:spPr>
-          <p:style>
-            <a:lnRef idx="2">
-              <a:schemeClr val="accent1">
-                <a:shade val="50000"/>
-              </a:schemeClr>
-            </a:lnRef>
-            <a:fillRef idx="1">
-              <a:schemeClr val="accent1"/>
-            </a:fillRef>
-            <a:effectRef idx="0">
-              <a:schemeClr val="accent1"/>
-            </a:effectRef>
-            <a:fontRef idx="minor">
-              <a:schemeClr val="lt1"/>
-            </a:fontRef>
-          </p:style>
-          <p:txBody>
-            <a:bodyPr rtlCol="0" anchor="ctr"/>
-            <a:lstStyle/>
-            <a:p>
-              <a:pPr algn="ctr"/>
-              <a:endParaRPr lang="en-US">
-                <a:solidFill>
-                  <a:schemeClr val="tx1"/>
-                </a:solidFill>
-              </a:endParaRPr>
-            </a:p>
-          </p:txBody>
-        </p:sp>
-        <p:sp>
-          <p:nvSpPr>
-            <p:cNvPr id="10" name="Curved Left Arrow 9"/>
-            <p:cNvSpPr/>
-            <p:nvPr/>
-          </p:nvSpPr>
-          <p:spPr>
-            <a:xfrm>
-              <a:off x="7315200" y="2819400"/>
-              <a:ext cx="731520" cy="1216152"/>
-            </a:xfrm>
-            <a:prstGeom prst="curvedLeftArrow">
-              <a:avLst/>
-            </a:prstGeom>
-          </p:spPr>
-          <p:style>
-            <a:lnRef idx="2">
-              <a:schemeClr val="accent1">
-                <a:shade val="50000"/>
-              </a:schemeClr>
-            </a:lnRef>
-            <a:fillRef idx="1">
-              <a:schemeClr val="accent1"/>
-            </a:fillRef>
-            <a:effectRef idx="0">
-              <a:schemeClr val="accent1"/>
-            </a:effectRef>
-            <a:fontRef idx="minor">
-              <a:schemeClr val="lt1"/>
-            </a:fontRef>
-          </p:style>
-          <p:txBody>
-            <a:bodyPr rtlCol="0" anchor="ctr"/>
-            <a:lstStyle/>
-            <a:p>
-              <a:pPr algn="ctr"/>
-              <a:endParaRPr lang="en-US">
-                <a:solidFill>
-                  <a:schemeClr val="tx1"/>
-                </a:solidFill>
-              </a:endParaRPr>
-            </a:p>
-          </p:txBody>
-        </p:sp>
-      </p:grpSp>
+          <a:prstGeom prst="rect">
+            <a:avLst/>
+          </a:prstGeom>
+        </p:spPr>
+        <p:style>
+          <a:lnRef idx="2">
+            <a:schemeClr val="accent1">
+              <a:shade val="50000"/>
+            </a:schemeClr>
+          </a:lnRef>
+          <a:fillRef idx="1">
+            <a:schemeClr val="accent1"/>
+          </a:fillRef>
+          <a:effectRef idx="0">
+            <a:schemeClr val="accent1"/>
+          </a:effectRef>
+          <a:fontRef idx="minor">
+            <a:schemeClr val="lt1"/>
+          </a:fontRef>
+        </p:style>
+        <p:txBody>
+          <a:bodyPr rtlCol="0" anchor="ctr"/>
+          <a:lstStyle/>
+          <a:p>
+            <a:pPr algn="ctr"/>
+            <a:endParaRPr lang="en-US"/>
+          </a:p>
+        </p:txBody>
+      </p:sp>
+      <p:sp>
+        <p:nvSpPr>
+          <p:cNvPr id="7" name="Rectangle 6"/>
+          <p:cNvSpPr/>
+          <p:nvPr/>
+        </p:nvSpPr>
+        <p:spPr>
+          <a:xfrm>
+            <a:off x="5410200" y="1905000"/>
+            <a:ext cx="1447800" cy="1143000"/>
+          </a:xfrm>
+          <a:prstGeom prst="rect">
+            <a:avLst/>
+          </a:prstGeom>
+        </p:spPr>
+        <p:style>
+          <a:lnRef idx="2">
+            <a:schemeClr val="accent1">
+              <a:shade val="50000"/>
+            </a:schemeClr>
+          </a:lnRef>
+          <a:fillRef idx="1">
+            <a:schemeClr val="accent1"/>
+          </a:fillRef>
+          <a:effectRef idx="0">
+            <a:schemeClr val="accent1"/>
+          </a:effectRef>
+          <a:fontRef idx="minor">
+            <a:schemeClr val="lt1"/>
+          </a:fontRef>
+        </p:style>
+        <p:txBody>
+          <a:bodyPr rtlCol="0" anchor="ctr"/>
+          <a:lstStyle/>
+          <a:p>
+            <a:pPr algn="ctr"/>
+            <a:endParaRPr lang="en-US"/>
+          </a:p>
+        </p:txBody>
+      </p:sp>
+      <p:sp>
+        <p:nvSpPr>
+          <p:cNvPr id="8" name="Rectangle 7"/>
+          <p:cNvSpPr/>
+          <p:nvPr/>
+        </p:nvSpPr>
+        <p:spPr>
+          <a:xfrm>
+            <a:off x="2667000" y="3657600"/>
+            <a:ext cx="2438400" cy="1143000"/>
+          </a:xfrm>
+          <a:prstGeom prst="rect">
+            <a:avLst/>
+          </a:prstGeom>
+        </p:spPr>
+        <p:style>
+          <a:lnRef idx="2">
+            <a:schemeClr val="accent1">
+              <a:shade val="50000"/>
+            </a:schemeClr>
+          </a:lnRef>
+          <a:fillRef idx="1">
+            <a:schemeClr val="accent1"/>
+          </a:fillRef>
+          <a:effectRef idx="0">
+            <a:schemeClr val="accent1"/>
+          </a:effectRef>
+          <a:fontRef idx="minor">
+            <a:schemeClr val="lt1"/>
+          </a:fontRef>
+        </p:style>
+        <p:txBody>
+          <a:bodyPr rtlCol="0" anchor="ctr"/>
+          <a:lstStyle/>
+          <a:p>
+            <a:pPr algn="ctr"/>
+            <a:endParaRPr lang="en-US"/>
+          </a:p>
+        </p:txBody>
+      </p:sp>
+      <p:sp>
+        <p:nvSpPr>
+          <p:cNvPr id="9" name="Rectangle 8"/>
+          <p:cNvSpPr/>
+          <p:nvPr/>
+        </p:nvSpPr>
+        <p:spPr>
+          <a:xfrm>
+            <a:off x="5105400" y="3657600"/>
+            <a:ext cx="1447800" cy="1143000"/>
+          </a:xfrm>
+          <a:prstGeom prst="rect">
+            <a:avLst/>
+          </a:prstGeom>
+        </p:spPr>
+        <p:style>
+          <a:lnRef idx="2">
+            <a:schemeClr val="accent1">
+              <a:shade val="50000"/>
+            </a:schemeClr>
+          </a:lnRef>
+          <a:fillRef idx="1">
+            <a:schemeClr val="accent1"/>
+          </a:fillRef>
+          <a:effectRef idx="0">
+            <a:schemeClr val="accent1"/>
+          </a:effectRef>
+          <a:fontRef idx="minor">
+            <a:schemeClr val="lt1"/>
+          </a:fontRef>
+        </p:style>
+        <p:txBody>
+          <a:bodyPr rtlCol="0" anchor="ctr"/>
+          <a:lstStyle/>
+          <a:p>
+            <a:pPr algn="ctr"/>
+            <a:endParaRPr lang="en-US"/>
+          </a:p>
+        </p:txBody>
+      </p:sp>
+      <p:sp>
+        <p:nvSpPr>
+          <p:cNvPr id="10" name="Curved Right Arrow 9"/>
+          <p:cNvSpPr/>
+          <p:nvPr/>
+        </p:nvSpPr>
+        <p:spPr>
+          <a:xfrm>
+            <a:off x="1066800" y="2819400"/>
+            <a:ext cx="731520" cy="1216152"/>
+          </a:xfrm>
+          <a:prstGeom prst="curvedRightArrow">
+            <a:avLst/>
+          </a:prstGeom>
+        </p:spPr>
+        <p:style>
+          <a:lnRef idx="2">
+            <a:schemeClr val="accent1">
+              <a:shade val="50000"/>
+            </a:schemeClr>
+          </a:lnRef>
+          <a:fillRef idx="1">
+            <a:schemeClr val="accent1"/>
+          </a:fillRef>
+          <a:effectRef idx="0">
+            <a:schemeClr val="accent1"/>
+          </a:effectRef>
+          <a:fontRef idx="minor">
+            <a:schemeClr val="lt1"/>
+          </a:fontRef>
+        </p:style>
+        <p:txBody>
+          <a:bodyPr rtlCol="0" anchor="ctr"/>
+          <a:lstStyle/>
+          <a:p>
+            <a:pPr algn="ctr"/>
+            <a:endParaRPr lang="en-US">
+              <a:solidFill>
+                <a:schemeClr val="tx1"/>
+              </a:solidFill>
+            </a:endParaRPr>
+          </a:p>
+        </p:txBody>
+      </p:sp>
+      <p:sp>
+        <p:nvSpPr>
+          <p:cNvPr id="12" name="Curved Left Arrow 11"/>
+          <p:cNvSpPr/>
+          <p:nvPr/>
+        </p:nvSpPr>
+        <p:spPr>
+          <a:xfrm>
+            <a:off x="7315200" y="2819400"/>
+            <a:ext cx="731520" cy="1216152"/>
+          </a:xfrm>
+          <a:prstGeom prst="curvedLeftArrow">
+            <a:avLst/>
+          </a:prstGeom>
+        </p:spPr>
+        <p:style>
+          <a:lnRef idx="2">
+            <a:schemeClr val="accent1">
+              <a:shade val="50000"/>
+            </a:schemeClr>
+          </a:lnRef>
+          <a:fillRef idx="1">
+            <a:schemeClr val="accent1"/>
+          </a:fillRef>
+          <a:effectRef idx="0">
+            <a:schemeClr val="accent1"/>
+          </a:effectRef>
+          <a:fontRef idx="minor">
+            <a:schemeClr val="lt1"/>
+          </a:fontRef>
+        </p:style>
+        <p:txBody>
+          <a:bodyPr rtlCol="0" anchor="ctr"/>
+          <a:lstStyle/>
+          <a:p>
+            <a:pPr algn="ctr"/>
+            <a:endParaRPr lang="en-US">
+              <a:solidFill>
+                <a:schemeClr val="tx1"/>
+              </a:solidFill>
+            </a:endParaRPr>
+          </a:p>
+        </p:txBody>
+      </p:sp>
     </p:spTree>
     <p:extLst>
       <p:ext uri="{BB962C8B-B14F-4D97-AF65-F5344CB8AC3E}">
-        <p14:creationId xmlns:p14="http://schemas.microsoft.com/office/powerpoint/2010/main" val="3088236805"/>
+        <p14:creationId xmlns:p14="http://schemas.microsoft.com/office/powerpoint/2010/main" val="2749985409"/>
       </p:ext>
     </p:extLst>
   </p:cSld>
@@ -9633,7 +9724,7 @@
         <p:spPr/>
         <p:txBody>
           <a:bodyPr>
-            <a:normAutofit fontScale="85000" lnSpcReduction="20000"/>
+            <a:normAutofit fontScale="62500" lnSpcReduction="20000"/>
           </a:bodyPr>
           <a:lstStyle/>
           <a:p>
@@ -9645,8 +9736,15 @@
             </a:r>
             <a:r>
               <a:rPr lang="en-US" dirty="0" smtClean="0"/>
-              <a:t>, by German Rodriguez</a:t>
-            </a:r>
+              <a:t>, by German </a:t>
+            </a:r>
+            <a:r>
+              <a:rPr lang="en-US" dirty="0" smtClean="0"/>
+              <a:t>Rodriguez</a:t>
+            </a:r>
+          </a:p>
+          <a:p>
+            <a:endParaRPr lang="en-US" dirty="0" smtClean="0"/>
           </a:p>
           <a:p>
             <a:r>
@@ -9674,11 +9772,20 @@
               <a:t> Press. </a:t>
             </a:r>
             <a:r>
-              <a:rPr lang="en-US" dirty="0" smtClean="0">
+              <a:rPr lang="en-US" sz="2900" dirty="0" smtClean="0">
                 <a:hlinkClick r:id="rId3"/>
               </a:rPr>
-              <a:t>http://www.stata.com/bookstore/data-management-using-stata/</a:t>
-            </a:r>
+              <a:t>http://www.stata.com/bookstore/data-management-using-stata</a:t>
+            </a:r>
+            <a:r>
+              <a:rPr lang="en-US" sz="2900" dirty="0" smtClean="0">
+                <a:hlinkClick r:id="rId3"/>
+              </a:rPr>
+              <a:t>/</a:t>
+            </a:r>
+            <a:endParaRPr lang="en-US" sz="2900" dirty="0"/>
+          </a:p>
+          <a:p>
             <a:endParaRPr lang="en-US" dirty="0" smtClean="0"/>
           </a:p>
           <a:p>
@@ -9690,8 +9797,17 @@
               <a:rPr lang="en-US" dirty="0" smtClean="0">
                 <a:hlinkClick r:id="rId4"/>
               </a:rPr>
-              <a:t>http://www.ats.ucla.edu/stat/stata/</a:t>
-            </a:r>
+              <a:t>http://www.ats.ucla.edu/stat/stata</a:t>
+            </a:r>
+            <a:r>
+              <a:rPr lang="en-US" dirty="0" smtClean="0">
+                <a:hlinkClick r:id="rId4"/>
+              </a:rPr>
+              <a:t>/</a:t>
+            </a:r>
+            <a:endParaRPr lang="en-US" dirty="0" smtClean="0"/>
+          </a:p>
+          <a:p>
             <a:endParaRPr lang="en-US" dirty="0" smtClean="0"/>
           </a:p>
           <a:p>
@@ -9705,7 +9821,9 @@
             </a:r>
           </a:p>
           <a:p>
-            <a:pPr lvl="1"/>
+            <a:pPr marL="457200" lvl="1" indent="0">
+              <a:buNone/>
+            </a:pPr>
             <a:r>
               <a:rPr lang="en-US" dirty="0" smtClean="0">
                 <a:hlinkClick r:id="rId5"/>
@@ -9715,7 +9833,9 @@
             <a:endParaRPr lang="en-US" dirty="0" smtClean="0"/>
           </a:p>
           <a:p>
-            <a:pPr lvl="1"/>
+            <a:pPr marL="457200" lvl="1" indent="0">
+              <a:buNone/>
+            </a:pPr>
             <a:r>
               <a:rPr lang="en-US" dirty="0" smtClean="0">
                 <a:hlinkClick r:id="rId6"/>
@@ -11879,21 +11999,7 @@
                 <a:latin typeface="Courier New"/>
                 <a:cs typeface="Courier New"/>
               </a:rPr>
-              <a:t>    </a:t>
-            </a:r>
-            <a:r>
-              <a:rPr lang="en-US" sz="1600" b="1" dirty="0" smtClean="0">
-                <a:latin typeface="Courier New"/>
-                <a:cs typeface="Courier New"/>
-              </a:rPr>
-              <a:t>+</a:t>
-            </a:r>
-            <a:r>
-              <a:rPr lang="en-US" sz="1600" b="1" dirty="0" smtClean="0">
-                <a:latin typeface="Courier New"/>
-                <a:cs typeface="Courier New"/>
-              </a:rPr>
-              <a:t>-------+</a:t>
+              <a:t>    +-------+</a:t>
             </a:r>
             <a:endParaRPr lang="en-US" sz="1600" b="1" dirty="0">
               <a:latin typeface="Courier New"/>

</xml_diff>

<commit_message>
final edit before posting
</commit_message>
<xml_diff>
--- a/dm.pptx
+++ b/dm.pptx
@@ -7604,14 +7604,14 @@
           <p:nvPr>
             <p:extLst>
               <p:ext uri="{D42A27DB-BD31-4B8C-83A1-F6EECF244321}">
-                <p14:modId xmlns:p14="http://schemas.microsoft.com/office/powerpoint/2010/main" val="3317762458"/>
+                <p14:modId xmlns:p14="http://schemas.microsoft.com/office/powerpoint/2010/main" val="2232173266"/>
               </p:ext>
             </p:extLst>
           </p:nvPr>
         </p:nvGraphicFramePr>
         <p:xfrm>
-          <a:off x="4495800" y="2362200"/>
-          <a:ext cx="3973788" cy="2095500"/>
+          <a:off x="4495798" y="2362200"/>
+          <a:ext cx="4292476" cy="2095500"/>
         </p:xfrm>
         <a:graphic>
           <a:graphicData uri="http://schemas.openxmlformats.org/drawingml/2006/table">
@@ -7620,10 +7620,10 @@
                 <a:tableStyleId>{5C22544A-7EE6-4342-B048-85BDC9FD1C3A}</a:tableStyleId>
               </a:tblPr>
               <a:tblGrid>
-                <a:gridCol w="993447"/>
-                <a:gridCol w="993447"/>
-                <a:gridCol w="993447"/>
-                <a:gridCol w="993447"/>
+                <a:gridCol w="1073119"/>
+                <a:gridCol w="1073119"/>
+                <a:gridCol w="1073119"/>
+                <a:gridCol w="1073119"/>
               </a:tblGrid>
               <a:tr h="419100">
                 <a:tc>
@@ -9736,11 +9736,7 @@
             </a:r>
             <a:r>
               <a:rPr lang="en-US" dirty="0" smtClean="0"/>
-              <a:t>, by German </a:t>
-            </a:r>
-            <a:r>
-              <a:rPr lang="en-US" dirty="0" smtClean="0"/>
-              <a:t>Rodriguez</a:t>
+              <a:t>, by German Rodriguez</a:t>
             </a:r>
           </a:p>
           <a:p>
@@ -9775,13 +9771,7 @@
               <a:rPr lang="en-US" sz="2900" dirty="0" smtClean="0">
                 <a:hlinkClick r:id="rId3"/>
               </a:rPr>
-              <a:t>http://www.stata.com/bookstore/data-management-using-stata</a:t>
-            </a:r>
-            <a:r>
-              <a:rPr lang="en-US" sz="2900" dirty="0" smtClean="0">
-                <a:hlinkClick r:id="rId3"/>
-              </a:rPr>
-              <a:t>/</a:t>
+              <a:t>http://www.stata.com/bookstore/data-management-using-stata/</a:t>
             </a:r>
             <a:endParaRPr lang="en-US" sz="2900" dirty="0"/>
           </a:p>
@@ -9797,13 +9787,7 @@
               <a:rPr lang="en-US" dirty="0" smtClean="0">
                 <a:hlinkClick r:id="rId4"/>
               </a:rPr>
-              <a:t>http://www.ats.ucla.edu/stat/stata</a:t>
-            </a:r>
-            <a:r>
-              <a:rPr lang="en-US" dirty="0" smtClean="0">
-                <a:hlinkClick r:id="rId4"/>
-              </a:rPr>
-              <a:t>/</a:t>
+              <a:t>http://www.ats.ucla.edu/stat/stata/</a:t>
             </a:r>
             <a:endParaRPr lang="en-US" dirty="0" smtClean="0"/>
           </a:p>

</xml_diff>